<commit_message>
added scatter and gather materials
</commit_message>
<xml_diff>
--- a/Lectures/Lecture 3/lecture3.pptx
+++ b/Lectures/Lecture 3/lecture3.pptx
@@ -14,6 +14,12 @@
     <p:sldId id="264" r:id="rId8"/>
     <p:sldId id="275" r:id="rId9"/>
     <p:sldId id="276" r:id="rId10"/>
+    <p:sldId id="278" r:id="rId11"/>
+    <p:sldId id="279" r:id="rId12"/>
+    <p:sldId id="280" r:id="rId13"/>
+    <p:sldId id="281" r:id="rId14"/>
+    <p:sldId id="277" r:id="rId15"/>
+    <p:sldId id="282" r:id="rId16"/>
   </p:sldIdLst>
   <p:sldSz cx="12192000" cy="6858000"/>
   <p:notesSz cx="6858000" cy="9144000"/>
@@ -3385,6 +3391,917 @@
 </p:sld>
 </file>
 
+<file path=ppt/slides/slide10.xml><?xml version="1.0" encoding="utf-8"?>
+<p:sld xmlns:a="http://schemas.openxmlformats.org/drawingml/2006/main" xmlns:r="http://schemas.openxmlformats.org/officeDocument/2006/relationships" xmlns:p="http://schemas.openxmlformats.org/presentationml/2006/main">
+  <p:cSld>
+    <p:spTree>
+      <p:nvGrpSpPr>
+        <p:cNvPr id="1" name=""/>
+        <p:cNvGrpSpPr/>
+        <p:nvPr/>
+      </p:nvGrpSpPr>
+      <p:grpSpPr>
+        <a:xfrm>
+          <a:off x="0" y="0"/>
+          <a:ext cx="0" cy="0"/>
+          <a:chOff x="0" y="0"/>
+          <a:chExt cx="0" cy="0"/>
+        </a:xfrm>
+      </p:grpSpPr>
+      <p:sp>
+        <p:nvSpPr>
+          <p:cNvPr id="2" name="Title 1">
+            <a:extLst>
+              <a:ext uri="{FF2B5EF4-FFF2-40B4-BE49-F238E27FC236}">
+                <a16:creationId xmlns:a16="http://schemas.microsoft.com/office/drawing/2014/main" id="{2F6F83A5-C6E3-4380-98C9-13206AE53231}"/>
+              </a:ext>
+            </a:extLst>
+          </p:cNvPr>
+          <p:cNvSpPr>
+            <a:spLocks noGrp="1"/>
+          </p:cNvSpPr>
+          <p:nvPr>
+            <p:ph type="title"/>
+          </p:nvPr>
+        </p:nvSpPr>
+        <p:spPr/>
+        <p:txBody>
+          <a:bodyPr/>
+          <a:lstStyle/>
+          <a:p>
+            <a:r>
+              <a:rPr lang="en-US" dirty="0"/>
+              <a:t>Message Passing with MPI</a:t>
+            </a:r>
+          </a:p>
+        </p:txBody>
+      </p:sp>
+      <p:sp>
+        <p:nvSpPr>
+          <p:cNvPr id="3" name="Content Placeholder 2">
+            <a:extLst>
+              <a:ext uri="{FF2B5EF4-FFF2-40B4-BE49-F238E27FC236}">
+                <a16:creationId xmlns:a16="http://schemas.microsoft.com/office/drawing/2014/main" id="{121983A5-D617-4513-95F0-A9325D0AA4BF}"/>
+              </a:ext>
+            </a:extLst>
+          </p:cNvPr>
+          <p:cNvSpPr>
+            <a:spLocks noGrp="1"/>
+          </p:cNvSpPr>
+          <p:nvPr>
+            <p:ph idx="1"/>
+          </p:nvPr>
+        </p:nvSpPr>
+        <p:spPr>
+          <a:xfrm>
+            <a:off x="2231136" y="2638044"/>
+            <a:ext cx="4278721" cy="3101983"/>
+          </a:xfrm>
+        </p:spPr>
+        <p:txBody>
+          <a:bodyPr>
+            <a:normAutofit fontScale="92500" lnSpcReduction="10000"/>
+          </a:bodyPr>
+          <a:lstStyle/>
+          <a:p>
+            <a:r>
+              <a:rPr lang="en-US" sz="1600" dirty="0">
+                <a:latin typeface="+mj-lt"/>
+              </a:rPr>
+              <a:t>We can enable passaging of messages between multiple processes via the following functions</a:t>
+            </a:r>
+          </a:p>
+          <a:p>
+            <a:pPr algn="l"/>
+            <a:r>
+              <a:rPr lang="en-US" sz="1600" b="0" dirty="0" err="1">
+                <a:solidFill>
+                  <a:srgbClr val="404040"/>
+                </a:solidFill>
+                <a:effectLst/>
+                <a:latin typeface="Consolas" panose="020B0609020204030204" pitchFamily="49" charset="0"/>
+              </a:rPr>
+              <a:t>MPI_recv</a:t>
+            </a:r>
+            <a:r>
+              <a:rPr lang="en-US" sz="1600" b="0" dirty="0">
+                <a:solidFill>
+                  <a:srgbClr val="404040"/>
+                </a:solidFill>
+                <a:effectLst/>
+                <a:latin typeface="Consolas" panose="020B0609020204030204" pitchFamily="49" charset="0"/>
+              </a:rPr>
+              <a:t>(void* buffer,</a:t>
+            </a:r>
+          </a:p>
+          <a:p>
+            <a:pPr marL="0" indent="0" algn="l">
+              <a:buNone/>
+            </a:pPr>
+            <a:r>
+              <a:rPr lang="en-US" sz="1600" b="0" dirty="0">
+                <a:solidFill>
+                  <a:srgbClr val="404040"/>
+                </a:solidFill>
+                <a:effectLst/>
+                <a:latin typeface="Consolas" panose="020B0609020204030204" pitchFamily="49" charset="0"/>
+              </a:rPr>
+              <a:t>             int count,</a:t>
+            </a:r>
+          </a:p>
+          <a:p>
+            <a:pPr marL="0" indent="0" algn="l">
+              <a:buNone/>
+            </a:pPr>
+            <a:r>
+              <a:rPr lang="en-US" sz="1600" b="0" dirty="0">
+                <a:solidFill>
+                  <a:srgbClr val="404040"/>
+                </a:solidFill>
+                <a:effectLst/>
+                <a:latin typeface="Consolas" panose="020B0609020204030204" pitchFamily="49" charset="0"/>
+              </a:rPr>
+              <a:t>             </a:t>
+            </a:r>
+            <a:r>
+              <a:rPr lang="en-US" sz="1600" b="0" dirty="0" err="1">
+                <a:solidFill>
+                  <a:srgbClr val="404040"/>
+                </a:solidFill>
+                <a:effectLst/>
+                <a:latin typeface="Consolas" panose="020B0609020204030204" pitchFamily="49" charset="0"/>
+              </a:rPr>
+              <a:t>MPI_Datatype</a:t>
+            </a:r>
+            <a:r>
+              <a:rPr lang="en-US" sz="1600" b="0" dirty="0">
+                <a:solidFill>
+                  <a:srgbClr val="404040"/>
+                </a:solidFill>
+                <a:effectLst/>
+                <a:latin typeface="Consolas" panose="020B0609020204030204" pitchFamily="49" charset="0"/>
+              </a:rPr>
+              <a:t> datatype,</a:t>
+            </a:r>
+          </a:p>
+          <a:p>
+            <a:pPr marL="0" indent="0" algn="l">
+              <a:buNone/>
+            </a:pPr>
+            <a:r>
+              <a:rPr lang="en-US" sz="1600" b="0" dirty="0">
+                <a:solidFill>
+                  <a:srgbClr val="404040"/>
+                </a:solidFill>
+                <a:effectLst/>
+                <a:latin typeface="Consolas" panose="020B0609020204030204" pitchFamily="49" charset="0"/>
+              </a:rPr>
+              <a:t>             int sender,</a:t>
+            </a:r>
+          </a:p>
+          <a:p>
+            <a:pPr marL="0" indent="0" algn="l">
+              <a:buNone/>
+            </a:pPr>
+            <a:r>
+              <a:rPr lang="en-US" sz="1600" b="0" dirty="0">
+                <a:solidFill>
+                  <a:srgbClr val="404040"/>
+                </a:solidFill>
+                <a:effectLst/>
+                <a:latin typeface="Consolas" panose="020B0609020204030204" pitchFamily="49" charset="0"/>
+              </a:rPr>
+              <a:t>             int tag,</a:t>
+            </a:r>
+          </a:p>
+          <a:p>
+            <a:pPr marL="0" indent="0" algn="l">
+              <a:buNone/>
+            </a:pPr>
+            <a:r>
+              <a:rPr lang="en-US" sz="1600" b="0" dirty="0">
+                <a:solidFill>
+                  <a:srgbClr val="404040"/>
+                </a:solidFill>
+                <a:effectLst/>
+                <a:latin typeface="Consolas" panose="020B0609020204030204" pitchFamily="49" charset="0"/>
+              </a:rPr>
+              <a:t>             </a:t>
+            </a:r>
+            <a:r>
+              <a:rPr lang="en-US" sz="1600" b="0" dirty="0" err="1">
+                <a:solidFill>
+                  <a:srgbClr val="404040"/>
+                </a:solidFill>
+                <a:effectLst/>
+                <a:latin typeface="Consolas" panose="020B0609020204030204" pitchFamily="49" charset="0"/>
+              </a:rPr>
+              <a:t>MPI_Comm</a:t>
+            </a:r>
+            <a:r>
+              <a:rPr lang="en-US" sz="1600" b="0" dirty="0">
+                <a:solidFill>
+                  <a:srgbClr val="404040"/>
+                </a:solidFill>
+                <a:effectLst/>
+                <a:latin typeface="Consolas" panose="020B0609020204030204" pitchFamily="49" charset="0"/>
+              </a:rPr>
+              <a:t> communicator,</a:t>
+            </a:r>
+          </a:p>
+          <a:p>
+            <a:pPr marL="0" indent="0" algn="l">
+              <a:buNone/>
+            </a:pPr>
+            <a:r>
+              <a:rPr lang="en-US" sz="1600" b="0" dirty="0">
+                <a:solidFill>
+                  <a:srgbClr val="404040"/>
+                </a:solidFill>
+                <a:effectLst/>
+                <a:latin typeface="Consolas" panose="020B0609020204030204" pitchFamily="49" charset="0"/>
+              </a:rPr>
+              <a:t>             </a:t>
+            </a:r>
+            <a:r>
+              <a:rPr lang="en-US" sz="1600" b="0" dirty="0" err="1">
+                <a:solidFill>
+                  <a:srgbClr val="404040"/>
+                </a:solidFill>
+                <a:effectLst/>
+                <a:latin typeface="Consolas" panose="020B0609020204030204" pitchFamily="49" charset="0"/>
+              </a:rPr>
+              <a:t>MPI_Status</a:t>
+            </a:r>
+            <a:r>
+              <a:rPr lang="en-US" sz="1600" b="0" dirty="0">
+                <a:solidFill>
+                  <a:srgbClr val="404040"/>
+                </a:solidFill>
+                <a:effectLst/>
+                <a:latin typeface="Consolas" panose="020B0609020204030204" pitchFamily="49" charset="0"/>
+              </a:rPr>
+              <a:t>* status);</a:t>
+            </a:r>
+            <a:br>
+              <a:rPr lang="en-US" sz="1600" b="0" dirty="0">
+                <a:solidFill>
+                  <a:srgbClr val="404040"/>
+                </a:solidFill>
+                <a:effectLst/>
+                <a:latin typeface="Consolas" panose="020B0609020204030204" pitchFamily="49" charset="0"/>
+              </a:rPr>
+            </a:br>
+            <a:endParaRPr lang="en-US" sz="1600" dirty="0">
+              <a:latin typeface="Consolas" panose="020B0609020204030204" pitchFamily="49" charset="0"/>
+            </a:endParaRPr>
+          </a:p>
+          <a:p>
+            <a:pPr marL="0" indent="0">
+              <a:buNone/>
+            </a:pPr>
+            <a:endParaRPr lang="en-US" sz="1600" dirty="0">
+              <a:latin typeface="+mj-lt"/>
+            </a:endParaRPr>
+          </a:p>
+        </p:txBody>
+      </p:sp>
+      <p:sp>
+        <p:nvSpPr>
+          <p:cNvPr id="4" name="TextBox 3">
+            <a:extLst>
+              <a:ext uri="{FF2B5EF4-FFF2-40B4-BE49-F238E27FC236}">
+                <a16:creationId xmlns:a16="http://schemas.microsoft.com/office/drawing/2014/main" id="{39C01479-5AA1-4D37-9587-2A463E563BBC}"/>
+              </a:ext>
+            </a:extLst>
+          </p:cNvPr>
+          <p:cNvSpPr txBox="1"/>
+          <p:nvPr/>
+        </p:nvSpPr>
+        <p:spPr>
+          <a:xfrm>
+            <a:off x="6358855" y="2996429"/>
+            <a:ext cx="3540154" cy="3046988"/>
+          </a:xfrm>
+          <a:prstGeom prst="rect">
+            <a:avLst/>
+          </a:prstGeom>
+          <a:noFill/>
+        </p:spPr>
+        <p:txBody>
+          <a:bodyPr wrap="square" rtlCol="0">
+            <a:spAutoFit/>
+          </a:bodyPr>
+          <a:lstStyle/>
+          <a:p>
+            <a:pPr marL="285750" indent="-285750">
+              <a:buFont typeface="Arial" panose="020B0604020202020204" pitchFamily="34" charset="0"/>
+              <a:buChar char="•"/>
+            </a:pPr>
+            <a:r>
+              <a:rPr lang="en-US" sz="1200" dirty="0"/>
+              <a:t>Buffer - The buffer in which receive the message. </a:t>
+            </a:r>
+          </a:p>
+          <a:p>
+            <a:pPr marL="285750" indent="-285750">
+              <a:buFont typeface="Arial" panose="020B0604020202020204" pitchFamily="34" charset="0"/>
+              <a:buChar char="•"/>
+            </a:pPr>
+            <a:r>
+              <a:rPr lang="en-US" sz="1200" dirty="0"/>
+              <a:t>Count - The number of elements in the buffer given.  The number of elements in the message to receive must therefore be less than or equal to that value. </a:t>
+            </a:r>
+          </a:p>
+          <a:p>
+            <a:pPr marL="285750" indent="-285750">
+              <a:buFont typeface="Arial" panose="020B0604020202020204" pitchFamily="34" charset="0"/>
+              <a:buChar char="•"/>
+            </a:pPr>
+            <a:r>
+              <a:rPr lang="en-US" sz="1200" dirty="0"/>
+              <a:t>Datatype - The type of one buffer element. </a:t>
+            </a:r>
+          </a:p>
+          <a:p>
+            <a:pPr marL="285750" indent="-285750">
+              <a:buFont typeface="Arial" panose="020B0604020202020204" pitchFamily="34" charset="0"/>
+              <a:buChar char="•"/>
+            </a:pPr>
+            <a:r>
+              <a:rPr lang="en-US" sz="1200" dirty="0"/>
+              <a:t>Sender - The rank of the sender MPI process. If there is no restriction on the sender's rank, MPI_ANY_SOURCE can be passed. </a:t>
+            </a:r>
+          </a:p>
+          <a:p>
+            <a:pPr marL="285750" indent="-285750">
+              <a:buFont typeface="Arial" panose="020B0604020202020204" pitchFamily="34" charset="0"/>
+              <a:buChar char="•"/>
+            </a:pPr>
+            <a:r>
+              <a:rPr lang="en-US" sz="1200" dirty="0"/>
+              <a:t>tag - The tag to require from the message. If no tag is required, MPI_ANY_TAG can be passed. </a:t>
+            </a:r>
+          </a:p>
+          <a:p>
+            <a:pPr marL="285750" indent="-285750">
+              <a:buFont typeface="Arial" panose="020B0604020202020204" pitchFamily="34" charset="0"/>
+              <a:buChar char="•"/>
+            </a:pPr>
+            <a:r>
+              <a:rPr lang="en-US" sz="1200" dirty="0"/>
+              <a:t>communicator - The communicator in which the communication takes place. </a:t>
+            </a:r>
+          </a:p>
+          <a:p>
+            <a:pPr marL="285750" indent="-285750">
+              <a:buFont typeface="Arial" panose="020B0604020202020204" pitchFamily="34" charset="0"/>
+              <a:buChar char="•"/>
+            </a:pPr>
+            <a:r>
+              <a:rPr lang="en-US" sz="1200" dirty="0"/>
+              <a:t>status - The variable in which store the status of the receive operation. Pass MPI_STATUS_IGNORE if unused.</a:t>
+            </a:r>
+          </a:p>
+        </p:txBody>
+      </p:sp>
+    </p:spTree>
+    <p:extLst>
+      <p:ext uri="{BB962C8B-B14F-4D97-AF65-F5344CB8AC3E}">
+        <p14:creationId xmlns:p14="http://schemas.microsoft.com/office/powerpoint/2010/main" val="491258929"/>
+      </p:ext>
+    </p:extLst>
+  </p:cSld>
+  <p:clrMapOvr>
+    <a:masterClrMapping/>
+  </p:clrMapOvr>
+</p:sld>
+</file>
+
+<file path=ppt/slides/slide11.xml><?xml version="1.0" encoding="utf-8"?>
+<p:sld xmlns:a="http://schemas.openxmlformats.org/drawingml/2006/main" xmlns:r="http://schemas.openxmlformats.org/officeDocument/2006/relationships" xmlns:p="http://schemas.openxmlformats.org/presentationml/2006/main">
+  <p:cSld>
+    <p:spTree>
+      <p:nvGrpSpPr>
+        <p:cNvPr id="1" name=""/>
+        <p:cNvGrpSpPr/>
+        <p:nvPr/>
+      </p:nvGrpSpPr>
+      <p:grpSpPr>
+        <a:xfrm>
+          <a:off x="0" y="0"/>
+          <a:ext cx="0" cy="0"/>
+          <a:chOff x="0" y="0"/>
+          <a:chExt cx="0" cy="0"/>
+        </a:xfrm>
+      </p:grpSpPr>
+      <p:sp>
+        <p:nvSpPr>
+          <p:cNvPr id="2" name="Title 1">
+            <a:extLst>
+              <a:ext uri="{FF2B5EF4-FFF2-40B4-BE49-F238E27FC236}">
+                <a16:creationId xmlns:a16="http://schemas.microsoft.com/office/drawing/2014/main" id="{63173FDF-B5EB-48E7-9912-6BABE84580FC}"/>
+              </a:ext>
+            </a:extLst>
+          </p:cNvPr>
+          <p:cNvSpPr>
+            <a:spLocks noGrp="1"/>
+          </p:cNvSpPr>
+          <p:nvPr>
+            <p:ph type="title"/>
+          </p:nvPr>
+        </p:nvSpPr>
+        <p:spPr/>
+        <p:txBody>
+          <a:bodyPr/>
+          <a:lstStyle/>
+          <a:p>
+            <a:r>
+              <a:rPr lang="en-US" dirty="0"/>
+              <a:t>Matrix Multiplication</a:t>
+            </a:r>
+          </a:p>
+        </p:txBody>
+      </p:sp>
+      <p:pic>
+        <p:nvPicPr>
+          <p:cNvPr id="5" name="Picture 4">
+            <a:extLst>
+              <a:ext uri="{FF2B5EF4-FFF2-40B4-BE49-F238E27FC236}">
+                <a16:creationId xmlns:a16="http://schemas.microsoft.com/office/drawing/2014/main" id="{8C25773A-3A80-478B-9BFB-7A7915D18A79}"/>
+              </a:ext>
+            </a:extLst>
+          </p:cNvPr>
+          <p:cNvPicPr>
+            <a:picLocks noChangeAspect="1"/>
+          </p:cNvPicPr>
+          <p:nvPr/>
+        </p:nvPicPr>
+        <p:blipFill rotWithShape="1">
+          <a:blip r:embed="rId2"/>
+          <a:srcRect l="58280" t="10184" r="22661" b="41131"/>
+          <a:stretch/>
+        </p:blipFill>
+        <p:spPr>
+          <a:xfrm>
+            <a:off x="3724713" y="2485700"/>
+            <a:ext cx="5032848" cy="3615655"/>
+          </a:xfrm>
+          <a:prstGeom prst="rect">
+            <a:avLst/>
+          </a:prstGeom>
+        </p:spPr>
+      </p:pic>
+    </p:spTree>
+    <p:extLst>
+      <p:ext uri="{BB962C8B-B14F-4D97-AF65-F5344CB8AC3E}">
+        <p14:creationId xmlns:p14="http://schemas.microsoft.com/office/powerpoint/2010/main" val="3194849788"/>
+      </p:ext>
+    </p:extLst>
+  </p:cSld>
+  <p:clrMapOvr>
+    <a:masterClrMapping/>
+  </p:clrMapOvr>
+</p:sld>
+</file>
+
+<file path=ppt/slides/slide12.xml><?xml version="1.0" encoding="utf-8"?>
+<p:sld xmlns:a="http://schemas.openxmlformats.org/drawingml/2006/main" xmlns:r="http://schemas.openxmlformats.org/officeDocument/2006/relationships" xmlns:p="http://schemas.openxmlformats.org/presentationml/2006/main">
+  <p:cSld>
+    <p:spTree>
+      <p:nvGrpSpPr>
+        <p:cNvPr id="1" name=""/>
+        <p:cNvGrpSpPr/>
+        <p:nvPr/>
+      </p:nvGrpSpPr>
+      <p:grpSpPr>
+        <a:xfrm>
+          <a:off x="0" y="0"/>
+          <a:ext cx="0" cy="0"/>
+          <a:chOff x="0" y="0"/>
+          <a:chExt cx="0" cy="0"/>
+        </a:xfrm>
+      </p:grpSpPr>
+      <p:sp>
+        <p:nvSpPr>
+          <p:cNvPr id="2" name="Title 1">
+            <a:extLst>
+              <a:ext uri="{FF2B5EF4-FFF2-40B4-BE49-F238E27FC236}">
+                <a16:creationId xmlns:a16="http://schemas.microsoft.com/office/drawing/2014/main" id="{180C4D25-B0BF-42E5-ACEA-826B023650DC}"/>
+              </a:ext>
+            </a:extLst>
+          </p:cNvPr>
+          <p:cNvSpPr>
+            <a:spLocks noGrp="1"/>
+          </p:cNvSpPr>
+          <p:nvPr>
+            <p:ph type="title"/>
+          </p:nvPr>
+        </p:nvSpPr>
+        <p:spPr/>
+        <p:txBody>
+          <a:bodyPr/>
+          <a:lstStyle/>
+          <a:p>
+            <a:r>
+              <a:rPr lang="en-US" dirty="0"/>
+              <a:t>Matrix Multiplication</a:t>
+            </a:r>
+          </a:p>
+        </p:txBody>
+      </p:sp>
+      <p:pic>
+        <p:nvPicPr>
+          <p:cNvPr id="5" name="Picture 4">
+            <a:extLst>
+              <a:ext uri="{FF2B5EF4-FFF2-40B4-BE49-F238E27FC236}">
+                <a16:creationId xmlns:a16="http://schemas.microsoft.com/office/drawing/2014/main" id="{8868746B-C912-4413-9C11-D75C9A2B0117}"/>
+              </a:ext>
+            </a:extLst>
+          </p:cNvPr>
+          <p:cNvPicPr>
+            <a:picLocks noChangeAspect="1"/>
+          </p:cNvPicPr>
+          <p:nvPr/>
+        </p:nvPicPr>
+        <p:blipFill rotWithShape="1">
+          <a:blip r:embed="rId2"/>
+          <a:srcRect l="58328" t="12210" r="23073" b="20041"/>
+          <a:stretch/>
+        </p:blipFill>
+        <p:spPr>
+          <a:xfrm>
+            <a:off x="624644" y="2143345"/>
+            <a:ext cx="4534586" cy="4645865"/>
+          </a:xfrm>
+          <a:prstGeom prst="rect">
+            <a:avLst/>
+          </a:prstGeom>
+        </p:spPr>
+      </p:pic>
+      <p:pic>
+        <p:nvPicPr>
+          <p:cNvPr id="7" name="Picture 6">
+            <a:extLst>
+              <a:ext uri="{FF2B5EF4-FFF2-40B4-BE49-F238E27FC236}">
+                <a16:creationId xmlns:a16="http://schemas.microsoft.com/office/drawing/2014/main" id="{00148D1C-4510-40CA-8B85-D53F40C112DF}"/>
+              </a:ext>
+            </a:extLst>
+          </p:cNvPr>
+          <p:cNvPicPr>
+            <a:picLocks noChangeAspect="1"/>
+          </p:cNvPicPr>
+          <p:nvPr/>
+        </p:nvPicPr>
+        <p:blipFill rotWithShape="1">
+          <a:blip r:embed="rId3"/>
+          <a:srcRect l="58211" t="39052" r="23830" b="14954"/>
+          <a:stretch/>
+        </p:blipFill>
+        <p:spPr>
+          <a:xfrm>
+            <a:off x="5419287" y="2387845"/>
+            <a:ext cx="5281652" cy="3804407"/>
+          </a:xfrm>
+          <a:prstGeom prst="rect">
+            <a:avLst/>
+          </a:prstGeom>
+        </p:spPr>
+      </p:pic>
+    </p:spTree>
+    <p:extLst>
+      <p:ext uri="{BB962C8B-B14F-4D97-AF65-F5344CB8AC3E}">
+        <p14:creationId xmlns:p14="http://schemas.microsoft.com/office/powerpoint/2010/main" val="2972229016"/>
+      </p:ext>
+    </p:extLst>
+  </p:cSld>
+  <p:clrMapOvr>
+    <a:masterClrMapping/>
+  </p:clrMapOvr>
+</p:sld>
+</file>
+
+<file path=ppt/slides/slide13.xml><?xml version="1.0" encoding="utf-8"?>
+<p:sld xmlns:a="http://schemas.openxmlformats.org/drawingml/2006/main" xmlns:r="http://schemas.openxmlformats.org/officeDocument/2006/relationships" xmlns:p="http://schemas.openxmlformats.org/presentationml/2006/main">
+  <p:cSld>
+    <p:spTree>
+      <p:nvGrpSpPr>
+        <p:cNvPr id="1" name=""/>
+        <p:cNvGrpSpPr/>
+        <p:nvPr/>
+      </p:nvGrpSpPr>
+      <p:grpSpPr>
+        <a:xfrm>
+          <a:off x="0" y="0"/>
+          <a:ext cx="0" cy="0"/>
+          <a:chOff x="0" y="0"/>
+          <a:chExt cx="0" cy="0"/>
+        </a:xfrm>
+      </p:grpSpPr>
+      <p:sp>
+        <p:nvSpPr>
+          <p:cNvPr id="2" name="Title 1">
+            <a:extLst>
+              <a:ext uri="{FF2B5EF4-FFF2-40B4-BE49-F238E27FC236}">
+                <a16:creationId xmlns:a16="http://schemas.microsoft.com/office/drawing/2014/main" id="{180C4D25-B0BF-42E5-ACEA-826B023650DC}"/>
+              </a:ext>
+            </a:extLst>
+          </p:cNvPr>
+          <p:cNvSpPr>
+            <a:spLocks noGrp="1"/>
+          </p:cNvSpPr>
+          <p:nvPr>
+            <p:ph type="title"/>
+          </p:nvPr>
+        </p:nvSpPr>
+        <p:spPr/>
+        <p:txBody>
+          <a:bodyPr/>
+          <a:lstStyle/>
+          <a:p>
+            <a:r>
+              <a:rPr lang="en-US" dirty="0"/>
+              <a:t>Matrix Multiplication</a:t>
+            </a:r>
+          </a:p>
+        </p:txBody>
+      </p:sp>
+      <p:pic>
+        <p:nvPicPr>
+          <p:cNvPr id="4" name="Picture 3">
+            <a:extLst>
+              <a:ext uri="{FF2B5EF4-FFF2-40B4-BE49-F238E27FC236}">
+                <a16:creationId xmlns:a16="http://schemas.microsoft.com/office/drawing/2014/main" id="{D5972DFB-671A-4F62-B2AF-AB4E0D52354D}"/>
+              </a:ext>
+            </a:extLst>
+          </p:cNvPr>
+          <p:cNvPicPr>
+            <a:picLocks noChangeAspect="1"/>
+          </p:cNvPicPr>
+          <p:nvPr/>
+        </p:nvPicPr>
+        <p:blipFill rotWithShape="1">
+          <a:blip r:embed="rId2"/>
+          <a:srcRect l="58073" t="24373" r="24106" b="32079"/>
+          <a:stretch/>
+        </p:blipFill>
+        <p:spPr>
+          <a:xfrm>
+            <a:off x="3157727" y="2709643"/>
+            <a:ext cx="5226342" cy="3591850"/>
+          </a:xfrm>
+          <a:prstGeom prst="rect">
+            <a:avLst/>
+          </a:prstGeom>
+        </p:spPr>
+      </p:pic>
+    </p:spTree>
+    <p:extLst>
+      <p:ext uri="{BB962C8B-B14F-4D97-AF65-F5344CB8AC3E}">
+        <p14:creationId xmlns:p14="http://schemas.microsoft.com/office/powerpoint/2010/main" val="800823217"/>
+      </p:ext>
+    </p:extLst>
+  </p:cSld>
+  <p:clrMapOvr>
+    <a:masterClrMapping/>
+  </p:clrMapOvr>
+</p:sld>
+</file>
+
+<file path=ppt/slides/slide14.xml><?xml version="1.0" encoding="utf-8"?>
+<p:sld xmlns:a="http://schemas.openxmlformats.org/drawingml/2006/main" xmlns:r="http://schemas.openxmlformats.org/officeDocument/2006/relationships" xmlns:p="http://schemas.openxmlformats.org/presentationml/2006/main">
+  <p:cSld>
+    <p:spTree>
+      <p:nvGrpSpPr>
+        <p:cNvPr id="1" name=""/>
+        <p:cNvGrpSpPr/>
+        <p:nvPr/>
+      </p:nvGrpSpPr>
+      <p:grpSpPr>
+        <a:xfrm>
+          <a:off x="0" y="0"/>
+          <a:ext cx="0" cy="0"/>
+          <a:chOff x="0" y="0"/>
+          <a:chExt cx="0" cy="0"/>
+        </a:xfrm>
+      </p:grpSpPr>
+      <p:sp>
+        <p:nvSpPr>
+          <p:cNvPr id="2" name="Title 1">
+            <a:extLst>
+              <a:ext uri="{FF2B5EF4-FFF2-40B4-BE49-F238E27FC236}">
+                <a16:creationId xmlns:a16="http://schemas.microsoft.com/office/drawing/2014/main" id="{D73925FB-E225-4FEF-B0DF-04A7B540F01B}"/>
+              </a:ext>
+            </a:extLst>
+          </p:cNvPr>
+          <p:cNvSpPr>
+            <a:spLocks noGrp="1"/>
+          </p:cNvSpPr>
+          <p:nvPr>
+            <p:ph type="title"/>
+          </p:nvPr>
+        </p:nvSpPr>
+        <p:spPr/>
+        <p:txBody>
+          <a:bodyPr/>
+          <a:lstStyle/>
+          <a:p>
+            <a:r>
+              <a:rPr lang="en-US" dirty="0" err="1"/>
+              <a:t>MPI_scatter</a:t>
+            </a:r>
+            <a:endParaRPr lang="en-US" dirty="0"/>
+          </a:p>
+        </p:txBody>
+      </p:sp>
+      <p:pic>
+        <p:nvPicPr>
+          <p:cNvPr id="11" name="Content Placeholder 10">
+            <a:extLst>
+              <a:ext uri="{FF2B5EF4-FFF2-40B4-BE49-F238E27FC236}">
+                <a16:creationId xmlns:a16="http://schemas.microsoft.com/office/drawing/2014/main" id="{701E2E9A-834E-4EC7-A22C-49DEF607686B}"/>
+              </a:ext>
+            </a:extLst>
+          </p:cNvPr>
+          <p:cNvPicPr>
+            <a:picLocks noGrp="1" noChangeAspect="1"/>
+          </p:cNvPicPr>
+          <p:nvPr>
+            <p:ph idx="1"/>
+          </p:nvPr>
+        </p:nvPicPr>
+        <p:blipFill rotWithShape="1">
+          <a:blip r:embed="rId2"/>
+          <a:srcRect l="14011" t="28175" r="70007" b="26306"/>
+          <a:stretch/>
+        </p:blipFill>
+        <p:spPr>
+          <a:xfrm>
+            <a:off x="6549007" y="2279247"/>
+            <a:ext cx="5047794" cy="4043494"/>
+          </a:xfrm>
+        </p:spPr>
+      </p:pic>
+      <p:pic>
+        <p:nvPicPr>
+          <p:cNvPr id="13" name="Picture 12">
+            <a:extLst>
+              <a:ext uri="{FF2B5EF4-FFF2-40B4-BE49-F238E27FC236}">
+                <a16:creationId xmlns:a16="http://schemas.microsoft.com/office/drawing/2014/main" id="{1801D5D7-5B77-456D-AA44-6E1C289A08E2}"/>
+              </a:ext>
+            </a:extLst>
+          </p:cNvPr>
+          <p:cNvPicPr>
+            <a:picLocks noChangeAspect="1"/>
+          </p:cNvPicPr>
+          <p:nvPr/>
+        </p:nvPicPr>
+        <p:blipFill rotWithShape="1">
+          <a:blip r:embed="rId3"/>
+          <a:srcRect l="58001" t="8817" r="15046" b="35863"/>
+          <a:stretch/>
+        </p:blipFill>
+        <p:spPr>
+          <a:xfrm>
+            <a:off x="100196" y="2279247"/>
+            <a:ext cx="6308993" cy="3928606"/>
+          </a:xfrm>
+          <a:prstGeom prst="rect">
+            <a:avLst/>
+          </a:prstGeom>
+        </p:spPr>
+      </p:pic>
+    </p:spTree>
+    <p:extLst>
+      <p:ext uri="{BB962C8B-B14F-4D97-AF65-F5344CB8AC3E}">
+        <p14:creationId xmlns:p14="http://schemas.microsoft.com/office/powerpoint/2010/main" val="3281535658"/>
+      </p:ext>
+    </p:extLst>
+  </p:cSld>
+  <p:clrMapOvr>
+    <a:masterClrMapping/>
+  </p:clrMapOvr>
+</p:sld>
+</file>
+
+<file path=ppt/slides/slide15.xml><?xml version="1.0" encoding="utf-8"?>
+<p:sld xmlns:a="http://schemas.openxmlformats.org/drawingml/2006/main" xmlns:r="http://schemas.openxmlformats.org/officeDocument/2006/relationships" xmlns:p="http://schemas.openxmlformats.org/presentationml/2006/main">
+  <p:cSld>
+    <p:spTree>
+      <p:nvGrpSpPr>
+        <p:cNvPr id="1" name=""/>
+        <p:cNvGrpSpPr/>
+        <p:nvPr/>
+      </p:nvGrpSpPr>
+      <p:grpSpPr>
+        <a:xfrm>
+          <a:off x="0" y="0"/>
+          <a:ext cx="0" cy="0"/>
+          <a:chOff x="0" y="0"/>
+          <a:chExt cx="0" cy="0"/>
+        </a:xfrm>
+      </p:grpSpPr>
+      <p:sp>
+        <p:nvSpPr>
+          <p:cNvPr id="2" name="Title 1">
+            <a:extLst>
+              <a:ext uri="{FF2B5EF4-FFF2-40B4-BE49-F238E27FC236}">
+                <a16:creationId xmlns:a16="http://schemas.microsoft.com/office/drawing/2014/main" id="{D73925FB-E225-4FEF-B0DF-04A7B540F01B}"/>
+              </a:ext>
+            </a:extLst>
+          </p:cNvPr>
+          <p:cNvSpPr>
+            <a:spLocks noGrp="1"/>
+          </p:cNvSpPr>
+          <p:nvPr>
+            <p:ph type="title"/>
+          </p:nvPr>
+        </p:nvSpPr>
+        <p:spPr/>
+        <p:txBody>
+          <a:bodyPr/>
+          <a:lstStyle/>
+          <a:p>
+            <a:r>
+              <a:rPr lang="en-US" dirty="0" err="1"/>
+              <a:t>MPI_gATHER</a:t>
+            </a:r>
+            <a:endParaRPr lang="en-US" dirty="0"/>
+          </a:p>
+        </p:txBody>
+      </p:sp>
+      <p:pic>
+        <p:nvPicPr>
+          <p:cNvPr id="6" name="Picture 5">
+            <a:extLst>
+              <a:ext uri="{FF2B5EF4-FFF2-40B4-BE49-F238E27FC236}">
+                <a16:creationId xmlns:a16="http://schemas.microsoft.com/office/drawing/2014/main" id="{1B9969F9-828B-4337-8853-40E68C82A755}"/>
+              </a:ext>
+            </a:extLst>
+          </p:cNvPr>
+          <p:cNvPicPr>
+            <a:picLocks noChangeAspect="1"/>
+          </p:cNvPicPr>
+          <p:nvPr/>
+        </p:nvPicPr>
+        <p:blipFill rotWithShape="1">
+          <a:blip r:embed="rId2"/>
+          <a:srcRect r="9358"/>
+          <a:stretch/>
+        </p:blipFill>
+        <p:spPr>
+          <a:xfrm>
+            <a:off x="6454008" y="2153412"/>
+            <a:ext cx="5637796" cy="4219575"/>
+          </a:xfrm>
+          <a:prstGeom prst="rect">
+            <a:avLst/>
+          </a:prstGeom>
+        </p:spPr>
+      </p:pic>
+      <p:pic>
+        <p:nvPicPr>
+          <p:cNvPr id="8" name="Picture 7">
+            <a:extLst>
+              <a:ext uri="{FF2B5EF4-FFF2-40B4-BE49-F238E27FC236}">
+                <a16:creationId xmlns:a16="http://schemas.microsoft.com/office/drawing/2014/main" id="{72B6A298-4B2C-4B3D-A067-5B12FC5AE70A}"/>
+              </a:ext>
+            </a:extLst>
+          </p:cNvPr>
+          <p:cNvPicPr>
+            <a:picLocks noChangeAspect="1"/>
+          </p:cNvPicPr>
+          <p:nvPr/>
+        </p:nvPicPr>
+        <p:blipFill>
+          <a:blip r:embed="rId3"/>
+          <a:stretch>
+            <a:fillRect/>
+          </a:stretch>
+        </p:blipFill>
+        <p:spPr>
+          <a:xfrm>
+            <a:off x="100196" y="2237302"/>
+            <a:ext cx="6353812" cy="4457113"/>
+          </a:xfrm>
+          <a:prstGeom prst="rect">
+            <a:avLst/>
+          </a:prstGeom>
+        </p:spPr>
+      </p:pic>
+    </p:spTree>
+    <p:extLst>
+      <p:ext uri="{BB962C8B-B14F-4D97-AF65-F5344CB8AC3E}">
+        <p14:creationId xmlns:p14="http://schemas.microsoft.com/office/powerpoint/2010/main" val="3758892892"/>
+      </p:ext>
+    </p:extLst>
+  </p:cSld>
+  <p:clrMapOvr>
+    <a:masterClrMapping/>
+  </p:clrMapOvr>
+</p:sld>
+</file>
+
 <file path=ppt/slides/slide2.xml><?xml version="1.0" encoding="utf-8"?>
 <p:sld xmlns:a="http://schemas.openxmlformats.org/drawingml/2006/main" xmlns:r="http://schemas.openxmlformats.org/officeDocument/2006/relationships" xmlns:p="http://schemas.openxmlformats.org/presentationml/2006/main">
   <p:cSld>
@@ -3465,7 +4382,24 @@
           <a:p>
             <a:r>
               <a:rPr lang="en-US" dirty="0"/>
-              <a:t>Tu</a:t>
+              <a:t>Synchronization</a:t>
+            </a:r>
+          </a:p>
+          <a:p>
+            <a:r>
+              <a:rPr lang="en-US" dirty="0"/>
+              <a:t>Send/</a:t>
+            </a:r>
+            <a:r>
+              <a:rPr lang="en-US"/>
+              <a:t>Recv</a:t>
+            </a:r>
+            <a:endParaRPr lang="en-US" dirty="0"/>
+          </a:p>
+          <a:p>
+            <a:r>
+              <a:rPr lang="en-US" dirty="0"/>
+              <a:t>Gather/Scatter</a:t>
             </a:r>
           </a:p>
         </p:txBody>
@@ -4627,12 +5561,8 @@
           <a:lstStyle/>
           <a:p>
             <a:r>
-              <a:rPr lang="en-US" dirty="0" err="1"/>
-              <a:t>Synchornization</a:t>
-            </a:r>
-            <a:r>
               <a:rPr lang="en-US" dirty="0"/>
-              <a:t> with MPI</a:t>
+              <a:t>Synchronization with MPI</a:t>
             </a:r>
           </a:p>
         </p:txBody>
@@ -4810,12 +5740,12 @@
         <p:spPr>
           <a:xfrm>
             <a:off x="2231136" y="2638044"/>
-            <a:ext cx="4212393" cy="3101983"/>
+            <a:ext cx="4278721" cy="3101983"/>
           </a:xfrm>
         </p:spPr>
         <p:txBody>
           <a:bodyPr>
-            <a:normAutofit fontScale="92500" lnSpcReduction="10000"/>
+            <a:normAutofit fontScale="85000" lnSpcReduction="20000"/>
           </a:bodyPr>
           <a:lstStyle/>
           <a:p>
@@ -4829,120 +5759,321 @@
           <a:p>
             <a:pPr algn="l"/>
             <a:r>
-              <a:rPr lang="en-US" sz="1600" b="0" i="1" dirty="0" err="1">
+              <a:rPr lang="en-US" sz="1600" b="0" dirty="0" err="1">
                 <a:solidFill>
                   <a:srgbClr val="404040"/>
                 </a:solidFill>
                 <a:effectLst/>
-                <a:latin typeface="Lato" panose="020F0502020204030203" pitchFamily="34" charset="0"/>
+                <a:latin typeface="Consolas" panose="020B0609020204030204" pitchFamily="49" charset="0"/>
               </a:rPr>
               <a:t>MPI_Send</a:t>
             </a:r>
             <a:r>
-              <a:rPr lang="en-US" sz="1600" b="0" i="1" dirty="0">
+              <a:rPr lang="en-US" sz="1600" b="0" dirty="0">
                 <a:solidFill>
                   <a:srgbClr val="404040"/>
                 </a:solidFill>
                 <a:effectLst/>
-                <a:latin typeface="Lato" panose="020F0502020204030203" pitchFamily="34" charset="0"/>
-              </a:rPr>
-              <a:t>() - the standard send in MPI</a:t>
-            </a:r>
-            <a:endParaRPr lang="en-US" sz="1600" b="0" i="0" dirty="0">
-              <a:solidFill>
-                <a:srgbClr val="404040"/>
-              </a:solidFill>
-              <a:effectLst/>
-              <a:latin typeface="Lato" panose="020F0502020204030203" pitchFamily="34" charset="0"/>
-            </a:endParaRPr>
-          </a:p>
-          <a:p>
-            <a:pPr algn="l"/>
-            <a:r>
-              <a:rPr lang="en-US" sz="1600" b="0" i="1" dirty="0" err="1">
+                <a:latin typeface="Consolas" panose="020B0609020204030204" pitchFamily="49" charset="0"/>
+              </a:rPr>
+              <a:t>(const void* </a:t>
+            </a:r>
+            <a:r>
+              <a:rPr lang="en-US" sz="1600" b="0" dirty="0" err="1">
                 <a:solidFill>
                   <a:srgbClr val="404040"/>
                 </a:solidFill>
                 <a:effectLst/>
-                <a:latin typeface="Lato" panose="020F0502020204030203" pitchFamily="34" charset="0"/>
-              </a:rPr>
-              <a:t>MPI_Recv</a:t>
-            </a:r>
-            <a:r>
-              <a:rPr lang="en-US" sz="1600" b="0" i="1" dirty="0">
+                <a:latin typeface="Consolas" panose="020B0609020204030204" pitchFamily="49" charset="0"/>
+              </a:rPr>
+              <a:t>buffer_send</a:t>
+            </a:r>
+            <a:r>
+              <a:rPr lang="en-US" sz="1600" b="0" dirty="0">
                 <a:solidFill>
                   <a:srgbClr val="404040"/>
                 </a:solidFill>
                 <a:effectLst/>
-                <a:latin typeface="Lato" panose="020F0502020204030203" pitchFamily="34" charset="0"/>
-              </a:rPr>
-              <a:t>() - the standard receives in MPI</a:t>
-            </a:r>
-          </a:p>
-          <a:p>
-            <a:pPr algn="l"/>
-            <a:r>
-              <a:rPr lang="en-US" sz="1600" b="0" i="1" dirty="0" err="1">
+                <a:latin typeface="Consolas" panose="020B0609020204030204" pitchFamily="49" charset="0"/>
+              </a:rPr>
+              <a:t>,</a:t>
+            </a:r>
+          </a:p>
+          <a:p>
+            <a:pPr marL="0" indent="0" algn="l">
+              <a:buNone/>
+            </a:pPr>
+            <a:r>
+              <a:rPr lang="en-US" sz="1600" b="0" dirty="0">
                 <a:solidFill>
                   <a:srgbClr val="404040"/>
                 </a:solidFill>
                 <a:effectLst/>
-                <a:latin typeface="Lato" panose="020F0502020204030203" pitchFamily="34" charset="0"/>
-              </a:rPr>
-              <a:t>MPI_</a:t>
-            </a:r>
-            <a:r>
-              <a:rPr lang="en-US" sz="1600" i="1" dirty="0" err="1">
+                <a:latin typeface="Consolas" panose="020B0609020204030204" pitchFamily="49" charset="0"/>
+              </a:rPr>
+              <a:t>           int </a:t>
+            </a:r>
+            <a:r>
+              <a:rPr lang="en-US" sz="1600" b="0" dirty="0" err="1">
                 <a:solidFill>
                   <a:srgbClr val="404040"/>
                 </a:solidFill>
-                <a:latin typeface="Lato" panose="020F0502020204030203" pitchFamily="34" charset="0"/>
-              </a:rPr>
-              <a:t>Gather</a:t>
-            </a:r>
-            <a:r>
-              <a:rPr lang="en-US" sz="1600" i="1" dirty="0">
+                <a:effectLst/>
+                <a:latin typeface="Consolas" panose="020B0609020204030204" pitchFamily="49" charset="0"/>
+              </a:rPr>
+              <a:t>count_send</a:t>
+            </a:r>
+            <a:r>
+              <a:rPr lang="en-US" sz="1600" b="0" dirty="0">
                 <a:solidFill>
                   <a:srgbClr val="404040"/>
                 </a:solidFill>
-                <a:latin typeface="Lato" panose="020F0502020204030203" pitchFamily="34" charset="0"/>
-              </a:rPr>
-              <a:t>() - collects data from all processes in a given communicator and concatenates them in the given buffer on the specified process.</a:t>
-            </a:r>
-          </a:p>
-          <a:p>
-            <a:pPr algn="l"/>
-            <a:r>
-              <a:rPr lang="en-US" sz="1600" b="0" i="1" dirty="0" err="1">
+                <a:effectLst/>
+                <a:latin typeface="Consolas" panose="020B0609020204030204" pitchFamily="49" charset="0"/>
+              </a:rPr>
+              <a:t>,</a:t>
+            </a:r>
+          </a:p>
+          <a:p>
+            <a:pPr marL="0" indent="0" algn="l">
+              <a:buNone/>
+            </a:pPr>
+            <a:r>
+              <a:rPr lang="en-US" sz="1600" b="0" dirty="0">
                 <a:solidFill>
                   <a:srgbClr val="404040"/>
                 </a:solidFill>
                 <a:effectLst/>
-                <a:latin typeface="Lato" panose="020F0502020204030203" pitchFamily="34" charset="0"/>
-              </a:rPr>
-              <a:t>MPI_Scatter</a:t>
-            </a:r>
-            <a:r>
-              <a:rPr lang="en-US" sz="1600" b="0" i="1" dirty="0">
+                <a:latin typeface="Consolas" panose="020B0609020204030204" pitchFamily="49" charset="0"/>
+              </a:rPr>
+              <a:t>           </a:t>
+            </a:r>
+            <a:r>
+              <a:rPr lang="en-US" sz="1600" b="0" dirty="0" err="1">
                 <a:solidFill>
                   <a:srgbClr val="404040"/>
                 </a:solidFill>
                 <a:effectLst/>
-                <a:latin typeface="Lato" panose="020F0502020204030203" pitchFamily="34" charset="0"/>
-              </a:rPr>
-              <a:t>() - dispatches data from a process across all processes in the same communicator</a:t>
+                <a:latin typeface="Consolas" panose="020B0609020204030204" pitchFamily="49" charset="0"/>
+              </a:rPr>
+              <a:t>MPI_Datatype</a:t>
+            </a:r>
+            <a:r>
+              <a:rPr lang="en-US" sz="1600" b="0" dirty="0">
+                <a:solidFill>
+                  <a:srgbClr val="404040"/>
+                </a:solidFill>
+                <a:effectLst/>
+                <a:latin typeface="Consolas" panose="020B0609020204030204" pitchFamily="49" charset="0"/>
+              </a:rPr>
+              <a:t> </a:t>
+            </a:r>
+            <a:r>
+              <a:rPr lang="en-US" sz="1600" b="0" dirty="0" err="1">
+                <a:solidFill>
+                  <a:srgbClr val="404040"/>
+                </a:solidFill>
+                <a:effectLst/>
+                <a:latin typeface="Consolas" panose="020B0609020204030204" pitchFamily="49" charset="0"/>
+              </a:rPr>
+              <a:t>datatype_send</a:t>
+            </a:r>
+            <a:r>
+              <a:rPr lang="en-US" sz="1600" b="0" dirty="0">
+                <a:solidFill>
+                  <a:srgbClr val="404040"/>
+                </a:solidFill>
+                <a:effectLst/>
+                <a:latin typeface="Consolas" panose="020B0609020204030204" pitchFamily="49" charset="0"/>
+              </a:rPr>
+              <a:t>,</a:t>
+            </a:r>
+          </a:p>
+          <a:p>
+            <a:pPr marL="0" indent="0" algn="l">
+              <a:buNone/>
+            </a:pPr>
+            <a:r>
+              <a:rPr lang="en-US" sz="1600" b="0" dirty="0">
+                <a:solidFill>
+                  <a:srgbClr val="404040"/>
+                </a:solidFill>
+                <a:effectLst/>
+                <a:latin typeface="Consolas" panose="020B0609020204030204" pitchFamily="49" charset="0"/>
+              </a:rPr>
+              <a:t>           void* </a:t>
+            </a:r>
+            <a:r>
+              <a:rPr lang="en-US" sz="1600" b="0" dirty="0" err="1">
+                <a:solidFill>
+                  <a:srgbClr val="404040"/>
+                </a:solidFill>
+                <a:effectLst/>
+                <a:latin typeface="Consolas" panose="020B0609020204030204" pitchFamily="49" charset="0"/>
+              </a:rPr>
+              <a:t>buffer_recv</a:t>
+            </a:r>
+            <a:r>
+              <a:rPr lang="en-US" sz="1600" b="0" dirty="0">
+                <a:solidFill>
+                  <a:srgbClr val="404040"/>
+                </a:solidFill>
+                <a:effectLst/>
+                <a:latin typeface="Consolas" panose="020B0609020204030204" pitchFamily="49" charset="0"/>
+              </a:rPr>
+              <a:t>,</a:t>
+            </a:r>
+          </a:p>
+          <a:p>
+            <a:pPr marL="0" indent="0" algn="l">
+              <a:buNone/>
+            </a:pPr>
+            <a:r>
+              <a:rPr lang="en-US" sz="1600" b="0" dirty="0">
+                <a:solidFill>
+                  <a:srgbClr val="404040"/>
+                </a:solidFill>
+                <a:effectLst/>
+                <a:latin typeface="Consolas" panose="020B0609020204030204" pitchFamily="49" charset="0"/>
+              </a:rPr>
+              <a:t>           int </a:t>
+            </a:r>
+            <a:r>
+              <a:rPr lang="en-US" sz="1600" b="0" dirty="0" err="1">
+                <a:solidFill>
+                  <a:srgbClr val="404040"/>
+                </a:solidFill>
+                <a:effectLst/>
+                <a:latin typeface="Consolas" panose="020B0609020204030204" pitchFamily="49" charset="0"/>
+              </a:rPr>
+              <a:t>count_recv</a:t>
+            </a:r>
+            <a:r>
+              <a:rPr lang="en-US" sz="1600" b="0" dirty="0">
+                <a:solidFill>
+                  <a:srgbClr val="404040"/>
+                </a:solidFill>
+                <a:effectLst/>
+                <a:latin typeface="Consolas" panose="020B0609020204030204" pitchFamily="49" charset="0"/>
+              </a:rPr>
+              <a:t>,</a:t>
+            </a:r>
+          </a:p>
+          <a:p>
+            <a:pPr marL="0" indent="0" algn="l">
+              <a:buNone/>
+            </a:pPr>
+            <a:r>
+              <a:rPr lang="en-US" sz="1600" b="0" dirty="0">
+                <a:solidFill>
+                  <a:srgbClr val="404040"/>
+                </a:solidFill>
+                <a:effectLst/>
+                <a:latin typeface="Consolas" panose="020B0609020204030204" pitchFamily="49" charset="0"/>
+              </a:rPr>
+              <a:t>           </a:t>
+            </a:r>
+            <a:r>
+              <a:rPr lang="en-US" sz="1600" b="0" dirty="0" err="1">
+                <a:solidFill>
+                  <a:srgbClr val="404040"/>
+                </a:solidFill>
+                <a:effectLst/>
+                <a:latin typeface="Consolas" panose="020B0609020204030204" pitchFamily="49" charset="0"/>
+              </a:rPr>
+              <a:t>MPI_Datatype</a:t>
+            </a:r>
+            <a:r>
+              <a:rPr lang="en-US" sz="1600" b="0" dirty="0">
+                <a:solidFill>
+                  <a:srgbClr val="404040"/>
+                </a:solidFill>
+                <a:effectLst/>
+                <a:latin typeface="Consolas" panose="020B0609020204030204" pitchFamily="49" charset="0"/>
+              </a:rPr>
+              <a:t> </a:t>
+            </a:r>
+            <a:r>
+              <a:rPr lang="en-US" sz="1600" b="0" dirty="0" err="1">
+                <a:solidFill>
+                  <a:srgbClr val="404040"/>
+                </a:solidFill>
+                <a:effectLst/>
+                <a:latin typeface="Consolas" panose="020B0609020204030204" pitchFamily="49" charset="0"/>
+              </a:rPr>
+              <a:t>datatype_recv</a:t>
+            </a:r>
+            <a:r>
+              <a:rPr lang="en-US" sz="1600" b="0" dirty="0">
+                <a:solidFill>
+                  <a:srgbClr val="404040"/>
+                </a:solidFill>
+                <a:effectLst/>
+                <a:latin typeface="Consolas" panose="020B0609020204030204" pitchFamily="49" charset="0"/>
+              </a:rPr>
+              <a:t>,</a:t>
+            </a:r>
+          </a:p>
+          <a:p>
+            <a:pPr marL="0" indent="0" algn="l">
+              <a:buNone/>
+            </a:pPr>
+            <a:r>
+              <a:rPr lang="en-US" sz="1600" b="0" dirty="0">
+                <a:solidFill>
+                  <a:srgbClr val="404040"/>
+                </a:solidFill>
+                <a:effectLst/>
+                <a:latin typeface="Consolas" panose="020B0609020204030204" pitchFamily="49" charset="0"/>
+              </a:rPr>
+              <a:t>           int root,</a:t>
+            </a:r>
+          </a:p>
+          <a:p>
+            <a:pPr marL="0" indent="0" algn="l">
+              <a:buNone/>
+            </a:pPr>
+            <a:r>
+              <a:rPr lang="en-US" sz="1600" b="0" dirty="0">
+                <a:solidFill>
+                  <a:srgbClr val="404040"/>
+                </a:solidFill>
+                <a:effectLst/>
+                <a:latin typeface="Consolas" panose="020B0609020204030204" pitchFamily="49" charset="0"/>
+              </a:rPr>
+              <a:t>           </a:t>
+            </a:r>
+            <a:r>
+              <a:rPr lang="en-US" sz="1600" b="0" dirty="0" err="1">
+                <a:solidFill>
+                  <a:srgbClr val="404040"/>
+                </a:solidFill>
+                <a:effectLst/>
+                <a:latin typeface="Consolas" panose="020B0609020204030204" pitchFamily="49" charset="0"/>
+              </a:rPr>
+              <a:t>MPI_Comm</a:t>
+            </a:r>
+            <a:r>
+              <a:rPr lang="en-US" sz="1600" b="0" dirty="0">
+                <a:solidFill>
+                  <a:srgbClr val="404040"/>
+                </a:solidFill>
+                <a:effectLst/>
+                <a:latin typeface="Consolas" panose="020B0609020204030204" pitchFamily="49" charset="0"/>
+              </a:rPr>
+              <a:t> communicator)</a:t>
             </a:r>
             <a:br>
-              <a:rPr lang="en-US" sz="1600" b="0" i="0" dirty="0">
+              <a:rPr lang="en-US" sz="1600" b="0" dirty="0">
                 <a:solidFill>
                   <a:srgbClr val="404040"/>
                 </a:solidFill>
                 <a:effectLst/>
-                <a:latin typeface="Lato" panose="020F0502020204030203" pitchFamily="34" charset="0"/>
+                <a:latin typeface="Consolas" panose="020B0609020204030204" pitchFamily="49" charset="0"/>
               </a:rPr>
             </a:br>
             <a:endParaRPr lang="en-US" sz="1600" dirty="0">
-              <a:latin typeface="+mj-lt"/>
+              <a:latin typeface="Consolas" panose="020B0609020204030204" pitchFamily="49" charset="0"/>
             </a:endParaRPr>
           </a:p>
           <a:p>
@@ -4955,35 +6086,129 @@
           </a:p>
         </p:txBody>
       </p:sp>
-      <p:pic>
-        <p:nvPicPr>
-          <p:cNvPr id="5" name="Picture 4">
+      <p:sp>
+        <p:nvSpPr>
+          <p:cNvPr id="4" name="TextBox 3">
             <a:extLst>
               <a:ext uri="{FF2B5EF4-FFF2-40B4-BE49-F238E27FC236}">
-                <a16:creationId xmlns:a16="http://schemas.microsoft.com/office/drawing/2014/main" id="{3CE7DF14-62C5-4517-8DF5-08E5027D2E0C}"/>
+                <a16:creationId xmlns:a16="http://schemas.microsoft.com/office/drawing/2014/main" id="{39C01479-5AA1-4D37-9587-2A463E563BBC}"/>
               </a:ext>
             </a:extLst>
           </p:cNvPr>
-          <p:cNvPicPr>
-            <a:picLocks noChangeAspect="1"/>
-          </p:cNvPicPr>
+          <p:cNvSpPr txBox="1"/>
           <p:nvPr/>
-        </p:nvPicPr>
-        <p:blipFill rotWithShape="1">
-          <a:blip r:embed="rId2"/>
-          <a:srcRect l="57936" t="7981" r="19953" b="23645"/>
-          <a:stretch/>
-        </p:blipFill>
+        </p:nvSpPr>
         <p:spPr>
           <a:xfrm>
-            <a:off x="6443529" y="2236281"/>
-            <a:ext cx="4972119" cy="4324286"/>
+            <a:off x="6358855" y="2996429"/>
+            <a:ext cx="3540154" cy="3416320"/>
           </a:xfrm>
           <a:prstGeom prst="rect">
             <a:avLst/>
           </a:prstGeom>
+          <a:noFill/>
         </p:spPr>
-      </p:pic>
+        <p:txBody>
+          <a:bodyPr wrap="square" rtlCol="0">
+            <a:spAutoFit/>
+          </a:bodyPr>
+          <a:lstStyle/>
+          <a:p>
+            <a:pPr marL="285750" indent="-285750">
+              <a:buFont typeface="Arial" panose="020B0604020202020204" pitchFamily="34" charset="0"/>
+              <a:buChar char="•"/>
+            </a:pPr>
+            <a:r>
+              <a:rPr lang="en-US" sz="1200" dirty="0" err="1"/>
+              <a:t>buffer_send</a:t>
+            </a:r>
+            <a:r>
+              <a:rPr lang="en-US" sz="1200" dirty="0"/>
+              <a:t> -  The buffer containing the data to dispatch from the root process. </a:t>
+            </a:r>
+          </a:p>
+          <a:p>
+            <a:pPr marL="285750" indent="-285750">
+              <a:buFont typeface="Arial" panose="020B0604020202020204" pitchFamily="34" charset="0"/>
+              <a:buChar char="•"/>
+            </a:pPr>
+            <a:r>
+              <a:rPr lang="en-US" sz="1200" dirty="0" err="1"/>
+              <a:t>count_send</a:t>
+            </a:r>
+            <a:r>
+              <a:rPr lang="en-US" sz="1200" dirty="0"/>
+              <a:t> - The number of elements to send to each process, not the total number of elements in the send buffer. For non-root processes, the send parameters like this one are ignored. </a:t>
+            </a:r>
+          </a:p>
+          <a:p>
+            <a:pPr marL="285750" indent="-285750">
+              <a:buFont typeface="Arial" panose="020B0604020202020204" pitchFamily="34" charset="0"/>
+              <a:buChar char="•"/>
+            </a:pPr>
+            <a:r>
+              <a:rPr lang="en-US" sz="1200" dirty="0" err="1"/>
+              <a:t>datatype_send</a:t>
+            </a:r>
+            <a:r>
+              <a:rPr lang="en-US" sz="1200" dirty="0"/>
+              <a:t> - The type of one send buffer element. For non-root processes, the send parameters like this one are ignored. </a:t>
+            </a:r>
+          </a:p>
+          <a:p>
+            <a:pPr marL="285750" indent="-285750">
+              <a:buFont typeface="Arial" panose="020B0604020202020204" pitchFamily="34" charset="0"/>
+              <a:buChar char="•"/>
+            </a:pPr>
+            <a:r>
+              <a:rPr lang="en-US" sz="1200" dirty="0" err="1"/>
+              <a:t>buffer_recv</a:t>
+            </a:r>
+            <a:r>
+              <a:rPr lang="en-US" sz="1200" dirty="0"/>
+              <a:t> - The buffer in which store the data dispatched. </a:t>
+            </a:r>
+          </a:p>
+          <a:p>
+            <a:pPr marL="285750" indent="-285750">
+              <a:buFont typeface="Arial" panose="020B0604020202020204" pitchFamily="34" charset="0"/>
+              <a:buChar char="•"/>
+            </a:pPr>
+            <a:r>
+              <a:rPr lang="en-US" sz="1200" dirty="0" err="1"/>
+              <a:t>count_recv</a:t>
+            </a:r>
+            <a:r>
+              <a:rPr lang="en-US" sz="1200" dirty="0"/>
+              <a:t> - The number of elements in the receive buffer. </a:t>
+            </a:r>
+          </a:p>
+          <a:p>
+            <a:pPr marL="285750" indent="-285750">
+              <a:buFont typeface="Arial" panose="020B0604020202020204" pitchFamily="34" charset="0"/>
+              <a:buChar char="•"/>
+            </a:pPr>
+            <a:r>
+              <a:rPr lang="en-US" sz="1200" dirty="0" err="1"/>
+              <a:t>datatype_recv</a:t>
+            </a:r>
+            <a:r>
+              <a:rPr lang="en-US" sz="1200" dirty="0"/>
+              <a:t> - The type of one receive buffer element. root The rank of the root process, which will dispatch the data to scatter. </a:t>
+            </a:r>
+          </a:p>
+          <a:p>
+            <a:pPr marL="285750" indent="-285750">
+              <a:buFont typeface="Arial" panose="020B0604020202020204" pitchFamily="34" charset="0"/>
+              <a:buChar char="•"/>
+            </a:pPr>
+            <a:r>
+              <a:rPr lang="en-US" sz="1200" dirty="0"/>
+              <a:t>Communicator - The communicator in which the scatter takes place.</a:t>
+            </a:r>
+          </a:p>
+        </p:txBody>
+      </p:sp>
     </p:spTree>
     <p:extLst>
       <p:ext uri="{BB962C8B-B14F-4D97-AF65-F5344CB8AC3E}">

</xml_diff>